<commit_message>
Présentation Installation locale du modèle OCR
</commit_message>
<xml_diff>
--- a/Presentation.pptx
+++ b/Presentation.pptx
@@ -114,6 +114,11 @@
       </a:defRPr>
     </a:lvl9pPr>
   </p:defaultTextStyle>
+  <p:extLst>
+    <p:ext uri="{EFAFB233-063F-42B5-8137-9DF3F51BA10A}">
+      <p15:sldGuideLst xmlns:p15="http://schemas.microsoft.com/office/powerpoint/2012/main"/>
+    </p:ext>
+  </p:extLst>
 </p:presentation>
 </file>
 
@@ -303,7 +308,7 @@
           <a:p>
             <a:fld id="{3ECE0937-EB16-4FB7-83E4-051A3D147AE6}" type="datetimeFigureOut">
               <a:rPr lang="fr-FR" smtClean="0"/>
-              <a:t>09/04/2024</a:t>
+              <a:t>10/04/2024</a:t>
             </a:fld>
             <a:endParaRPr lang="fr-FR"/>
           </a:p>
@@ -578,7 +583,7 @@
           <a:p>
             <a:fld id="{3ECE0937-EB16-4FB7-83E4-051A3D147AE6}" type="datetimeFigureOut">
               <a:rPr lang="fr-FR" smtClean="0"/>
-              <a:t>09/04/2024</a:t>
+              <a:t>10/04/2024</a:t>
             </a:fld>
             <a:endParaRPr lang="fr-FR"/>
           </a:p>
@@ -772,7 +777,7 @@
           <a:p>
             <a:fld id="{3ECE0937-EB16-4FB7-83E4-051A3D147AE6}" type="datetimeFigureOut">
               <a:rPr lang="fr-FR" smtClean="0"/>
-              <a:t>09/04/2024</a:t>
+              <a:t>10/04/2024</a:t>
             </a:fld>
             <a:endParaRPr lang="fr-FR"/>
           </a:p>
@@ -1045,7 +1050,7 @@
           <a:p>
             <a:fld id="{3ECE0937-EB16-4FB7-83E4-051A3D147AE6}" type="datetimeFigureOut">
               <a:rPr lang="fr-FR" smtClean="0"/>
-              <a:t>09/04/2024</a:t>
+              <a:t>10/04/2024</a:t>
             </a:fld>
             <a:endParaRPr lang="fr-FR"/>
           </a:p>
@@ -1386,7 +1391,7 @@
           <a:p>
             <a:fld id="{3ECE0937-EB16-4FB7-83E4-051A3D147AE6}" type="datetimeFigureOut">
               <a:rPr lang="fr-FR" smtClean="0"/>
-              <a:t>09/04/2024</a:t>
+              <a:t>10/04/2024</a:t>
             </a:fld>
             <a:endParaRPr lang="fr-FR"/>
           </a:p>
@@ -2009,7 +2014,7 @@
           <a:p>
             <a:fld id="{3ECE0937-EB16-4FB7-83E4-051A3D147AE6}" type="datetimeFigureOut">
               <a:rPr lang="fr-FR" smtClean="0"/>
-              <a:t>09/04/2024</a:t>
+              <a:t>10/04/2024</a:t>
             </a:fld>
             <a:endParaRPr lang="fr-FR"/>
           </a:p>
@@ -2869,7 +2874,7 @@
           <a:p>
             <a:fld id="{3ECE0937-EB16-4FB7-83E4-051A3D147AE6}" type="datetimeFigureOut">
               <a:rPr lang="fr-FR" smtClean="0"/>
-              <a:t>09/04/2024</a:t>
+              <a:t>10/04/2024</a:t>
             </a:fld>
             <a:endParaRPr lang="fr-FR"/>
           </a:p>
@@ -3039,7 +3044,7 @@
           <a:p>
             <a:fld id="{3ECE0937-EB16-4FB7-83E4-051A3D147AE6}" type="datetimeFigureOut">
               <a:rPr lang="fr-FR" smtClean="0"/>
-              <a:t>09/04/2024</a:t>
+              <a:t>10/04/2024</a:t>
             </a:fld>
             <a:endParaRPr lang="fr-FR"/>
           </a:p>
@@ -3219,7 +3224,7 @@
           <a:p>
             <a:fld id="{3ECE0937-EB16-4FB7-83E4-051A3D147AE6}" type="datetimeFigureOut">
               <a:rPr lang="fr-FR" smtClean="0"/>
-              <a:t>09/04/2024</a:t>
+              <a:t>10/04/2024</a:t>
             </a:fld>
             <a:endParaRPr lang="fr-FR"/>
           </a:p>
@@ -3389,7 +3394,7 @@
           <a:p>
             <a:fld id="{3ECE0937-EB16-4FB7-83E4-051A3D147AE6}" type="datetimeFigureOut">
               <a:rPr lang="fr-FR" smtClean="0"/>
-              <a:t>09/04/2024</a:t>
+              <a:t>10/04/2024</a:t>
             </a:fld>
             <a:endParaRPr lang="fr-FR"/>
           </a:p>
@@ -3636,7 +3641,7 @@
           <a:p>
             <a:fld id="{3ECE0937-EB16-4FB7-83E4-051A3D147AE6}" type="datetimeFigureOut">
               <a:rPr lang="fr-FR" smtClean="0"/>
-              <a:t>09/04/2024</a:t>
+              <a:t>10/04/2024</a:t>
             </a:fld>
             <a:endParaRPr lang="fr-FR"/>
           </a:p>
@@ -3928,7 +3933,7 @@
           <a:p>
             <a:fld id="{3ECE0937-EB16-4FB7-83E4-051A3D147AE6}" type="datetimeFigureOut">
               <a:rPr lang="fr-FR" smtClean="0"/>
-              <a:t>09/04/2024</a:t>
+              <a:t>10/04/2024</a:t>
             </a:fld>
             <a:endParaRPr lang="fr-FR"/>
           </a:p>
@@ -4372,7 +4377,7 @@
           <a:p>
             <a:fld id="{3ECE0937-EB16-4FB7-83E4-051A3D147AE6}" type="datetimeFigureOut">
               <a:rPr lang="fr-FR" smtClean="0"/>
-              <a:t>09/04/2024</a:t>
+              <a:t>10/04/2024</a:t>
             </a:fld>
             <a:endParaRPr lang="fr-FR"/>
           </a:p>
@@ -4490,7 +4495,7 @@
           <a:p>
             <a:fld id="{3ECE0937-EB16-4FB7-83E4-051A3D147AE6}" type="datetimeFigureOut">
               <a:rPr lang="fr-FR" smtClean="0"/>
-              <a:t>09/04/2024</a:t>
+              <a:t>10/04/2024</a:t>
             </a:fld>
             <a:endParaRPr lang="fr-FR"/>
           </a:p>
@@ -4585,7 +4590,7 @@
           <a:p>
             <a:fld id="{3ECE0937-EB16-4FB7-83E4-051A3D147AE6}" type="datetimeFigureOut">
               <a:rPr lang="fr-FR" smtClean="0"/>
-              <a:t>09/04/2024</a:t>
+              <a:t>10/04/2024</a:t>
             </a:fld>
             <a:endParaRPr lang="fr-FR"/>
           </a:p>
@@ -4864,7 +4869,7 @@
           <a:p>
             <a:fld id="{3ECE0937-EB16-4FB7-83E4-051A3D147AE6}" type="datetimeFigureOut">
               <a:rPr lang="fr-FR" smtClean="0"/>
-              <a:t>09/04/2024</a:t>
+              <a:t>10/04/2024</a:t>
             </a:fld>
             <a:endParaRPr lang="fr-FR"/>
           </a:p>
@@ -5139,7 +5144,7 @@
           <a:p>
             <a:fld id="{3ECE0937-EB16-4FB7-83E4-051A3D147AE6}" type="datetimeFigureOut">
               <a:rPr lang="fr-FR" smtClean="0"/>
-              <a:t>09/04/2024</a:t>
+              <a:t>10/04/2024</a:t>
             </a:fld>
             <a:endParaRPr lang="fr-FR"/>
           </a:p>
@@ -5568,7 +5573,7 @@
           <a:p>
             <a:fld id="{3ECE0937-EB16-4FB7-83E4-051A3D147AE6}" type="datetimeFigureOut">
               <a:rPr lang="fr-FR" smtClean="0"/>
-              <a:t>09/04/2024</a:t>
+              <a:t>10/04/2024</a:t>
             </a:fld>
             <a:endParaRPr lang="fr-FR"/>
           </a:p>
@@ -6296,13 +6301,13 @@
         </p:nvSpPr>
         <p:spPr>
           <a:xfrm>
-            <a:off x="1103312" y="1248356"/>
-            <a:ext cx="10187540" cy="5000044"/>
+            <a:off x="1103313" y="1248356"/>
+            <a:ext cx="8478010" cy="5000044"/>
           </a:xfrm>
         </p:spPr>
         <p:txBody>
           <a:bodyPr>
-            <a:normAutofit fontScale="62500" lnSpcReduction="20000"/>
+            <a:normAutofit fontScale="85000" lnSpcReduction="20000"/>
           </a:bodyPr>
           <a:lstStyle/>
           <a:p>
@@ -6320,13 +6325,20 @@
             <a:pPr lvl="1"/>
             <a:r>
               <a:rPr lang="fr-FR" dirty="0"/>
-              <a:t>Un réseau neuronal est un modèle mathématique inspiré du fonctionnement du cerveau humain. Il est composé de plusieurs couches de neurones interconnectés, qui transforment les données d'entrée en données de sortie en passant par un </a:t>
-            </a:r>
-            <a:r>
-              <a:rPr lang="fr-FR" dirty="0" smtClean="0"/>
-              <a:t>processus d'apprentissage.</a:t>
-            </a:r>
-            <a:endParaRPr lang="fr-FR" dirty="0"/>
+              <a:t>Un réseau neuronal est un modèle mathématique </a:t>
+            </a:r>
+            <a:r>
+              <a:rPr lang="fr-FR" dirty="0">
+                <a:solidFill>
+                  <a:srgbClr val="FFFF00"/>
+                </a:solidFill>
+              </a:rPr>
+              <a:t>inspiré</a:t>
+            </a:r>
+            <a:r>
+              <a:rPr lang="fr-FR" dirty="0"/>
+              <a:t> du fonctionnement du cerveau humain. </a:t>
+            </a:r>
           </a:p>
           <a:p>
             <a:pPr lvl="1"/>
@@ -6336,7 +6348,79 @@
             </a:r>
             <a:r>
               <a:rPr lang="fr-FR" dirty="0"/>
-              <a:t>neurone dans un réseau neuronal est une unité de traitement simple qui prend des entrées, effectue des calculs sur ces entrées à l'aide de poids et de biais, puis transmet un signal de sortie. Ces neurones sont organisés en couches, avec une couche d'entrée pour recevoir les données, une ou plusieurs couches cachées pour effectuer des transformations complexes, et une couche de sortie pour produire les résultats</a:t>
+              <a:t>neurone dans un réseau neuronal est une unité de traitement simple qui prend des </a:t>
+            </a:r>
+            <a:r>
+              <a:rPr lang="fr-FR" dirty="0">
+                <a:solidFill>
+                  <a:srgbClr val="92D050"/>
+                </a:solidFill>
+              </a:rPr>
+              <a:t>entrées</a:t>
+            </a:r>
+            <a:r>
+              <a:rPr lang="fr-FR" dirty="0"/>
+              <a:t>, effectue des calculs sur ces entrées à l'aide de poids et de biais, puis transmet un signal de </a:t>
+            </a:r>
+            <a:r>
+              <a:rPr lang="fr-FR" dirty="0">
+                <a:solidFill>
+                  <a:srgbClr val="FFFF00"/>
+                </a:solidFill>
+              </a:rPr>
+              <a:t>sortie</a:t>
+            </a:r>
+            <a:r>
+              <a:rPr lang="fr-FR" dirty="0"/>
+              <a:t>. </a:t>
+            </a:r>
+            <a:endParaRPr lang="fr-FR" dirty="0" smtClean="0"/>
+          </a:p>
+          <a:p>
+            <a:pPr lvl="1"/>
+            <a:r>
+              <a:rPr lang="fr-FR" dirty="0" smtClean="0"/>
+              <a:t>Ces </a:t>
+            </a:r>
+            <a:r>
+              <a:rPr lang="fr-FR" dirty="0"/>
+              <a:t>neurones sont organisés en couches, avec une </a:t>
+            </a:r>
+            <a:r>
+              <a:rPr lang="fr-FR" dirty="0">
+                <a:solidFill>
+                  <a:srgbClr val="92D050"/>
+                </a:solidFill>
+              </a:rPr>
+              <a:t>couche d'entrée</a:t>
+            </a:r>
+            <a:r>
+              <a:rPr lang="fr-FR" dirty="0"/>
+              <a:t> pour recevoir les données, une ou plusieurs </a:t>
+            </a:r>
+            <a:r>
+              <a:rPr lang="fr-FR" dirty="0">
+                <a:solidFill>
+                  <a:srgbClr val="00B0F0"/>
+                </a:solidFill>
+              </a:rPr>
+              <a:t>couches cachées </a:t>
+            </a:r>
+            <a:r>
+              <a:rPr lang="fr-FR" dirty="0"/>
+              <a:t>pour effectuer des transformations complexes, et une </a:t>
+            </a:r>
+            <a:r>
+              <a:rPr lang="fr-FR" dirty="0">
+                <a:solidFill>
+                  <a:srgbClr val="FFFF00"/>
+                </a:solidFill>
+              </a:rPr>
+              <a:t>couche de sortie </a:t>
+            </a:r>
+            <a:r>
+              <a:rPr lang="fr-FR" dirty="0"/>
+              <a:t>pour produire les résultats</a:t>
             </a:r>
             <a:r>
               <a:rPr lang="fr-FR" dirty="0" smtClean="0"/>
@@ -6344,96 +6428,51 @@
             </a:r>
           </a:p>
           <a:p>
+            <a:r>
+              <a:rPr lang="fr-FR" dirty="0" smtClean="0"/>
+              <a:t>Entraînement d'un réseau neuronal :</a:t>
+            </a:r>
+          </a:p>
+          <a:p>
             <a:pPr lvl="1"/>
             <a:r>
+              <a:rPr lang="fr-FR" dirty="0" smtClean="0"/>
+              <a:t>L'entraînement </a:t>
+            </a:r>
+            <a:r>
               <a:rPr lang="fr-FR" dirty="0"/>
-              <a:t>Il existe différents types de réseaux neuronaux, adaptés à différents types de tâches et de données. Parmi les architectures courantes, on trouve les réseaux de neurones multicouches (MLP) pour l'apprentissage supervisé, les réseaux de neurones récurrents (RNN) pour les données séquentielles, les réseaux de neurones </a:t>
-            </a:r>
-            <a:r>
-              <a:rPr lang="fr-FR" dirty="0" err="1"/>
-              <a:t>convolutifs</a:t>
-            </a:r>
-            <a:r>
-              <a:rPr lang="fr-FR" dirty="0"/>
-              <a:t> (CNN) pour la vision par ordinateur, et les réseaux générateurs adverses (GAN) pour la génération de contenu</a:t>
-            </a:r>
-            <a:r>
-              <a:rPr lang="fr-FR" dirty="0" smtClean="0"/>
-              <a:t>.</a:t>
-            </a:r>
-            <a:endParaRPr lang="fr-FR" dirty="0"/>
-          </a:p>
-          <a:p>
-            <a:r>
-              <a:rPr lang="fr-FR" dirty="0"/>
-              <a:t>Entraînement d'un réseau neuronal </a:t>
-            </a:r>
-            <a:r>
-              <a:rPr lang="fr-FR" dirty="0" smtClean="0"/>
-              <a:t>:</a:t>
-            </a:r>
-            <a:endParaRPr lang="fr-FR" dirty="0"/>
+              <a:t>d'un réseau neuronal consiste </a:t>
+            </a:r>
+            <a:r>
+              <a:rPr lang="fr-FR" dirty="0" smtClean="0"/>
+              <a:t>à montrer au réseau, un très </a:t>
+            </a:r>
+            <a:r>
+              <a:rPr lang="fr-FR" dirty="0" err="1" smtClean="0"/>
+              <a:t>très</a:t>
+            </a:r>
+            <a:r>
+              <a:rPr lang="fr-FR" dirty="0" smtClean="0"/>
+              <a:t> grand nombre d’exemples (</a:t>
+            </a:r>
+            <a:r>
+              <a:rPr lang="fr-FR" i="1" dirty="0" smtClean="0">
+                <a:solidFill>
+                  <a:srgbClr val="FFFF00"/>
+                </a:solidFill>
+              </a:rPr>
+              <a:t>des millions ou même des milliards</a:t>
+            </a:r>
+            <a:r>
+              <a:rPr lang="fr-FR" dirty="0" smtClean="0"/>
+              <a:t>) qui donnent les bons résultats, puis à ajuster à chaque fois les coefficients.</a:t>
+            </a:r>
           </a:p>
           <a:p>
             <a:pPr lvl="1"/>
             <a:r>
-              <a:rPr lang="fr-FR" dirty="0"/>
-              <a:t>L'entraînement d'un réseau neuronal consiste à ajuster les poids et les biais des neurones afin de minimiser l'erreur entre les prédictions du réseau et les vraies valeurs cibles. Cela se fait généralement à l'aide d'un algorithme d'optimisation tel que la </a:t>
-            </a:r>
-            <a:r>
-              <a:rPr lang="fr-FR" dirty="0" err="1"/>
-              <a:t>rétropropagation</a:t>
-            </a:r>
-            <a:r>
-              <a:rPr lang="fr-FR" dirty="0"/>
-              <a:t> du gradient, qui calcule les gradients de l'erreur par rapport aux poids et ajuste ces poids en conséquence</a:t>
-            </a:r>
-            <a:r>
-              <a:rPr lang="fr-FR" dirty="0" smtClean="0"/>
-              <a:t>.</a:t>
-            </a:r>
-            <a:endParaRPr lang="fr-FR" dirty="0"/>
-          </a:p>
-          <a:p>
-            <a:r>
-              <a:rPr lang="fr-FR" dirty="0" smtClean="0"/>
-              <a:t>Limites </a:t>
-            </a:r>
-            <a:r>
-              <a:rPr lang="fr-FR" dirty="0"/>
-              <a:t>des réseaux neuronaux </a:t>
-            </a:r>
-            <a:r>
-              <a:rPr lang="fr-FR" dirty="0" smtClean="0"/>
-              <a:t>:</a:t>
-            </a:r>
-            <a:endParaRPr lang="fr-FR" dirty="0"/>
-          </a:p>
-          <a:p>
-            <a:pPr lvl="1"/>
-            <a:r>
-              <a:rPr lang="fr-FR" dirty="0"/>
-              <a:t>Malgré leurs avantages, les réseaux neuronaux présentent également des limites, notamment en termes de besoin en données d'entraînement volumineuses, de temps de calcul élevé, et de complexité de l'interprétation des résultats. De plus, ils peuvent être sensibles au </a:t>
-            </a:r>
-            <a:r>
-              <a:rPr lang="fr-FR" dirty="0" err="1"/>
-              <a:t>surapprentissage</a:t>
-            </a:r>
-            <a:r>
-              <a:rPr lang="fr-FR" dirty="0"/>
-              <a:t> et nécessitent souvent un ajustement minutieux des </a:t>
-            </a:r>
-            <a:r>
-              <a:rPr lang="fr-FR" dirty="0" err="1"/>
-              <a:t>hyperparamètres</a:t>
-            </a:r>
-            <a:r>
-              <a:rPr lang="fr-FR" dirty="0"/>
-              <a:t> pour obtenir de bons </a:t>
-            </a:r>
-            <a:r>
-              <a:rPr lang="fr-FR" dirty="0" smtClean="0"/>
-              <a:t>résultats.</a:t>
+              <a:rPr lang="fr-FR" dirty="0" smtClean="0"/>
+              <a:t>Ensuite, le réseau peut être capable de répondre aux questions s’approchant à ce qui a été entraîné.</a:t>
             </a:r>
             <a:endParaRPr lang="fr-FR" dirty="0"/>
           </a:p>
@@ -6456,19 +6495,32 @@
             </a:r>
             <a:endParaRPr lang="fr-FR" dirty="0" smtClean="0"/>
           </a:p>
-          <a:p>
-            <a:pPr lvl="1"/>
-            <a:r>
-              <a:rPr lang="fr-FR" dirty="0" smtClean="0"/>
-              <a:t>Leur </a:t>
-            </a:r>
-            <a:r>
-              <a:rPr lang="fr-FR" dirty="0"/>
-              <a:t>utilisation continue de croître dans de nombreux domaines, ouvrant la voie à de nouvelles avancées et découvertes dans le domaine de l'intelligence artificielle.</a:t>
-            </a:r>
-          </a:p>
-        </p:txBody>
-      </p:sp>
+        </p:txBody>
+      </p:sp>
+      <p:pic>
+        <p:nvPicPr>
+          <p:cNvPr id="5" name="Image 4"/>
+          <p:cNvPicPr>
+            <a:picLocks noChangeAspect="1"/>
+          </p:cNvPicPr>
+          <p:nvPr/>
+        </p:nvPicPr>
+        <p:blipFill>
+          <a:blip r:embed="rId2"/>
+          <a:stretch>
+            <a:fillRect/>
+          </a:stretch>
+        </p:blipFill>
+        <p:spPr>
+          <a:xfrm>
+            <a:off x="9362094" y="2380926"/>
+            <a:ext cx="2562225" cy="1781175"/>
+          </a:xfrm>
+          <a:prstGeom prst="rect">
+            <a:avLst/>
+          </a:prstGeom>
+        </p:spPr>
+      </p:pic>
     </p:spTree>
     <p:extLst>
       <p:ext uri="{BB962C8B-B14F-4D97-AF65-F5344CB8AC3E}">
@@ -7803,12 +7855,12 @@
         <p:spPr>
           <a:xfrm>
             <a:off x="1103311" y="1311966"/>
-            <a:ext cx="9392411" cy="4936434"/>
+            <a:ext cx="10950866" cy="4936434"/>
           </a:xfrm>
         </p:spPr>
         <p:txBody>
           <a:bodyPr>
-            <a:normAutofit fontScale="55000" lnSpcReduction="20000"/>
+            <a:normAutofit fontScale="85000" lnSpcReduction="10000"/>
           </a:bodyPr>
           <a:lstStyle/>
           <a:p>
@@ -7834,7 +7886,27 @@
             </a:r>
             <a:r>
               <a:rPr lang="fr-FR" dirty="0"/>
-              <a:t> est un exemple fascinant d'application de l'intelligence artificielle, spécifiquement dans le domaine du traitement du langage naturel (NLP). </a:t>
+              <a:t> est </a:t>
+            </a:r>
+            <a:r>
+              <a:rPr lang="fr-FR" dirty="0" smtClean="0"/>
+              <a:t>une application informatique accessible sur le NET, basée sur un </a:t>
+            </a:r>
+            <a:r>
+              <a:rPr lang="fr-FR" dirty="0"/>
+              <a:t>modèle de langage </a:t>
+            </a:r>
+            <a:r>
+              <a:rPr lang="fr-FR" dirty="0" smtClean="0"/>
+              <a:t>construit par apprentissage, </a:t>
+            </a:r>
+            <a:r>
+              <a:rPr lang="fr-FR" dirty="0"/>
+              <a:t>développé par </a:t>
+            </a:r>
+            <a:r>
+              <a:rPr lang="fr-FR" dirty="0" err="1" smtClean="0"/>
+              <a:t>OpenAI</a:t>
             </a:r>
             <a:endParaRPr lang="fr-FR" dirty="0" smtClean="0"/>
           </a:p>
@@ -7842,83 +7914,73 @@
             <a:pPr lvl="1"/>
             <a:r>
               <a:rPr lang="fr-FR" dirty="0" smtClean="0"/>
-              <a:t>Il </a:t>
+              <a:t>C’est </a:t>
             </a:r>
             <a:r>
               <a:rPr lang="fr-FR" dirty="0"/>
-              <a:t>s'agit d'un modèle de langage basé sur le </a:t>
+              <a:t>capable de générer du texte </a:t>
+            </a:r>
+            <a:r>
+              <a:rPr lang="fr-FR" dirty="0" smtClean="0"/>
+              <a:t>presque comme un humain </a:t>
+            </a:r>
+            <a:r>
+              <a:rPr lang="fr-FR" dirty="0"/>
+              <a:t>en réponse à des </a:t>
+            </a:r>
+            <a:r>
+              <a:rPr lang="fr-FR" dirty="0" smtClean="0"/>
+              <a:t>textes qu’on lui donne.</a:t>
+            </a:r>
+            <a:endParaRPr lang="fr-FR" dirty="0"/>
+          </a:p>
+          <a:p>
+            <a:pPr lvl="1"/>
+            <a:r>
+              <a:rPr lang="fr-FR" dirty="0" smtClean="0"/>
+              <a:t>Ce </a:t>
+            </a:r>
+            <a:r>
+              <a:rPr lang="fr-FR" dirty="0"/>
+              <a:t>modèle est pré-entraîné sur </a:t>
+            </a:r>
+            <a:r>
+              <a:rPr lang="fr-FR" dirty="0" smtClean="0"/>
+              <a:t>des immenses base de données de texte (pratiquement tout le WEB). </a:t>
+            </a:r>
+          </a:p>
+          <a:p>
+            <a:pPr lvl="1"/>
+            <a:r>
+              <a:rPr lang="fr-FR" dirty="0" smtClean="0"/>
+              <a:t>En fonction des informations que l’on lui donne, il en déduit ce qui devrait probablement être logiquement associé pour compléter ce qu’on lui a dit.</a:t>
+            </a:r>
+            <a:endParaRPr lang="fr-FR" dirty="0"/>
+          </a:p>
+          <a:p>
+            <a:r>
+              <a:rPr lang="fr-FR" dirty="0"/>
+              <a:t>Limites de </a:t>
             </a:r>
             <a:r>
               <a:rPr lang="fr-FR" dirty="0" err="1"/>
-              <a:t>deep</a:t>
+              <a:t>ChatGPT</a:t>
             </a:r>
             <a:r>
               <a:rPr lang="fr-FR" dirty="0"/>
               <a:t> </a:t>
             </a:r>
             <a:r>
-              <a:rPr lang="fr-FR" dirty="0" err="1"/>
-              <a:t>learning</a:t>
-            </a:r>
+              <a:rPr lang="fr-FR" dirty="0" smtClean="0"/>
+              <a:t>:</a:t>
+            </a:r>
+            <a:endParaRPr lang="fr-FR" dirty="0"/>
+          </a:p>
+          <a:p>
+            <a:pPr lvl="1"/>
             <a:r>
               <a:rPr lang="fr-FR" dirty="0"/>
-              <a:t>, développé par </a:t>
-            </a:r>
-            <a:r>
-              <a:rPr lang="fr-FR" dirty="0" err="1"/>
-              <a:t>OpenAI</a:t>
-            </a:r>
-            <a:r>
-              <a:rPr lang="fr-FR" dirty="0"/>
-              <a:t>, qui est capable de générer du texte cohérent et humain-</a:t>
-            </a:r>
-            <a:r>
-              <a:rPr lang="fr-FR" dirty="0" err="1"/>
-              <a:t>like</a:t>
-            </a:r>
-            <a:r>
-              <a:rPr lang="fr-FR" dirty="0"/>
-              <a:t> en réponse à des inputs donnés</a:t>
-            </a:r>
-            <a:r>
-              <a:rPr lang="fr-FR" dirty="0" smtClean="0"/>
-              <a:t>.</a:t>
-            </a:r>
-            <a:endParaRPr lang="fr-FR" dirty="0"/>
-          </a:p>
-          <a:p>
-            <a:pPr lvl="1"/>
-            <a:r>
-              <a:rPr lang="fr-FR" dirty="0" err="1" smtClean="0"/>
-              <a:t>ChatGPT</a:t>
-            </a:r>
-            <a:r>
-              <a:rPr lang="fr-FR" dirty="0" smtClean="0"/>
-              <a:t> </a:t>
-            </a:r>
-            <a:r>
-              <a:rPr lang="fr-FR" dirty="0"/>
-              <a:t>fonctionne en utilisant un modèle de réseaux neuronaux profonds appelé Transformer. </a:t>
-            </a:r>
-            <a:endParaRPr lang="fr-FR" dirty="0" smtClean="0"/>
-          </a:p>
-          <a:p>
-            <a:pPr lvl="1"/>
-            <a:r>
-              <a:rPr lang="fr-FR" dirty="0" smtClean="0"/>
-              <a:t>Ce </a:t>
-            </a:r>
-            <a:r>
-              <a:rPr lang="fr-FR" dirty="0"/>
-              <a:t>modèle est pré-entraîné sur de vastes corpus de texte afin d'apprendre la structure et la syntaxe du langage humain. Lorsqu'il est alimenté avec une </a:t>
-            </a:r>
-            <a:r>
-              <a:rPr lang="fr-FR" dirty="0" smtClean="0"/>
-              <a:t>séquence de </a:t>
-            </a:r>
-            <a:r>
-              <a:rPr lang="fr-FR" dirty="0"/>
-              <a:t>mots, </a:t>
+              <a:t>Bien que </a:t>
             </a:r>
             <a:r>
               <a:rPr lang="fr-FR" dirty="0" err="1"/>
@@ -7926,7 +7988,19 @@
             </a:r>
             <a:r>
               <a:rPr lang="fr-FR" dirty="0"/>
-              <a:t> utilise son apprentissage pour générer une réponse appropriée en fonction du contexte</a:t>
+              <a:t> soit très performant dans de nombreuses situations, il a également ses limites. Par exemple, il peut parfois générer des réponses incohérentes ou inappropriées, en particulier lorsqu'il est confronté à des questions ambiguës ou à des sujets complexes. </a:t>
+            </a:r>
+            <a:endParaRPr lang="fr-FR" dirty="0" smtClean="0"/>
+          </a:p>
+          <a:p>
+            <a:pPr lvl="1"/>
+            <a:r>
+              <a:rPr lang="fr-FR" dirty="0" smtClean="0"/>
+              <a:t>De </a:t>
+            </a:r>
+            <a:r>
+              <a:rPr lang="fr-FR" dirty="0"/>
+              <a:t>plus, il peut reproduire des biais présents dans les données d'entraînement, ce qui soulève des préoccupations en matière d'éthique et de déontologie</a:t>
             </a:r>
             <a:r>
               <a:rPr lang="fr-FR" dirty="0" smtClean="0"/>
@@ -7935,9 +8009,14 @@
             <a:endParaRPr lang="fr-FR" dirty="0"/>
           </a:p>
           <a:p>
+            <a:pPr lvl="1"/>
+            <a:r>
+              <a:rPr lang="fr-FR" dirty="0" smtClean="0"/>
+              <a:t>Au </a:t>
+            </a:r>
             <a:r>
               <a:rPr lang="fr-FR" dirty="0"/>
-              <a:t>Capacités de </a:t>
+              <a:t>fil du temps, </a:t>
             </a:r>
             <a:r>
               <a:rPr lang="fr-FR" dirty="0" err="1"/>
@@ -7945,137 +8024,7 @@
             </a:r>
             <a:r>
               <a:rPr lang="fr-FR" dirty="0"/>
-              <a:t> </a:t>
-            </a:r>
-            <a:r>
-              <a:rPr lang="fr-FR" dirty="0" smtClean="0"/>
-              <a:t>:</a:t>
-            </a:r>
-            <a:endParaRPr lang="fr-FR" dirty="0"/>
-          </a:p>
-          <a:p>
-            <a:pPr lvl="1"/>
-            <a:r>
-              <a:rPr lang="fr-FR" dirty="0"/>
-              <a:t>Ce qui rend </a:t>
-            </a:r>
-            <a:r>
-              <a:rPr lang="fr-FR" dirty="0" err="1"/>
-              <a:t>ChatGPT</a:t>
-            </a:r>
-            <a:r>
-              <a:rPr lang="fr-FR" dirty="0"/>
-              <a:t> si impressionnant, c'est sa capacité à comprendre et à générer du langage naturel de manière fluide. Il peut répondre à une grande variété de questions, participer à des conversations, rédiger des textes, et même écrire des poèmes ou des histoires. Cela ouvre de nombreuses possibilités d'applications, de l'assistance virtuelle à la création de contenu automatisé</a:t>
-            </a:r>
-            <a:r>
-              <a:rPr lang="fr-FR" dirty="0" smtClean="0"/>
-              <a:t>.</a:t>
-            </a:r>
-            <a:endParaRPr lang="fr-FR" dirty="0"/>
-          </a:p>
-          <a:p>
-            <a:r>
-              <a:rPr lang="fr-FR" dirty="0"/>
-              <a:t>Limites de </a:t>
-            </a:r>
-            <a:r>
-              <a:rPr lang="fr-FR" dirty="0" err="1"/>
-              <a:t>ChatGPT</a:t>
-            </a:r>
-            <a:r>
-              <a:rPr lang="fr-FR" dirty="0"/>
-              <a:t> </a:t>
-            </a:r>
-            <a:r>
-              <a:rPr lang="fr-FR" dirty="0" smtClean="0"/>
-              <a:t>:</a:t>
-            </a:r>
-            <a:endParaRPr lang="fr-FR" dirty="0"/>
-          </a:p>
-          <a:p>
-            <a:pPr lvl="1"/>
-            <a:r>
-              <a:rPr lang="fr-FR" dirty="0"/>
-              <a:t>Bien que </a:t>
-            </a:r>
-            <a:r>
-              <a:rPr lang="fr-FR" dirty="0" err="1"/>
-              <a:t>ChatGPT</a:t>
-            </a:r>
-            <a:r>
-              <a:rPr lang="fr-FR" dirty="0"/>
-              <a:t> soit très performant dans de nombreuses situations, il a également ses limites. Par exemple, il peut parfois générer des réponses incohérentes ou inappropriées, en particulier lorsqu'il est confronté à des questions ambiguës ou à des sujets complexes. De plus, il peut reproduire des biais présents dans les données d'entraînement, ce qui soulève des préoccupations en matière d'éthique et de déontologie</a:t>
-            </a:r>
-            <a:r>
-              <a:rPr lang="fr-FR" dirty="0" smtClean="0"/>
-              <a:t>.</a:t>
-            </a:r>
-            <a:endParaRPr lang="fr-FR" dirty="0"/>
-          </a:p>
-          <a:p>
-            <a:pPr lvl="1"/>
-            <a:r>
-              <a:rPr lang="fr-FR" dirty="0" smtClean="0"/>
-              <a:t>Au </a:t>
-            </a:r>
-            <a:r>
-              <a:rPr lang="fr-FR" dirty="0"/>
-              <a:t>fil du temps, </a:t>
-            </a:r>
-            <a:r>
-              <a:rPr lang="fr-FR" dirty="0" err="1"/>
-              <a:t>ChatGPT</a:t>
-            </a:r>
-            <a:r>
-              <a:rPr lang="fr-FR" dirty="0"/>
               <a:t> et d'autres modèles similaires continuent à s'améliorer grâce à des mises à jour régulières et à de nouveaux entraînements sur des ensembles de données plus vastes et diversifiés. Ces avancées contribuent à accroître la précision, la cohérence et la pertinence des réponses générées par ces modèles, ouvrant la voie à de nouvelles applications et innovations dans le domaine du traitement du langage naturel</a:t>
-            </a:r>
-            <a:r>
-              <a:rPr lang="fr-FR" dirty="0" smtClean="0"/>
-              <a:t>.</a:t>
-            </a:r>
-            <a:endParaRPr lang="fr-FR" dirty="0"/>
-          </a:p>
-          <a:p>
-            <a:r>
-              <a:rPr lang="fr-FR" dirty="0"/>
-              <a:t>Conclusion sur </a:t>
-            </a:r>
-            <a:r>
-              <a:rPr lang="fr-FR" dirty="0" err="1"/>
-              <a:t>ChatGPT</a:t>
-            </a:r>
-            <a:r>
-              <a:rPr lang="fr-FR" dirty="0"/>
-              <a:t> </a:t>
-            </a:r>
-            <a:r>
-              <a:rPr lang="fr-FR" dirty="0" smtClean="0"/>
-              <a:t>:</a:t>
-            </a:r>
-            <a:endParaRPr lang="fr-FR" dirty="0"/>
-          </a:p>
-          <a:p>
-            <a:pPr lvl="1"/>
-            <a:r>
-              <a:rPr lang="fr-FR" dirty="0" err="1" smtClean="0"/>
-              <a:t>ChatGPT</a:t>
-            </a:r>
-            <a:r>
-              <a:rPr lang="fr-FR" dirty="0" smtClean="0"/>
-              <a:t> </a:t>
-            </a:r>
-            <a:r>
-              <a:rPr lang="fr-FR" dirty="0"/>
-              <a:t>représente une avancée majeure dans le domaine du traitement du langage naturel, offrant des capacités impressionnantes pour générer du texte humain-</a:t>
-            </a:r>
-            <a:r>
-              <a:rPr lang="fr-FR" dirty="0" err="1"/>
-              <a:t>like</a:t>
-            </a:r>
-            <a:r>
-              <a:rPr lang="fr-FR" dirty="0"/>
-              <a:t>. Bien qu'il ait encore des limitations, son potentiel est immense, et il continue d'évoluer rapidement grâce aux progrès de la recherche en intelligence artificielle</a:t>
             </a:r>
             <a:r>
               <a:rPr lang="fr-FR" dirty="0" smtClean="0"/>

</xml_diff>